<commit_message>
removed questionable team name
</commit_message>
<xml_diff>
--- a/design/presentation/Kompose_Presentation.pptx
+++ b/design/presentation/Kompose_Presentation.pptx
@@ -3760,6 +3760,42 @@
           </a:prstGeom>
         </p:spPr>
       </p:pic>
+      <p:pic>
+        <p:nvPicPr>
+          <p:cNvPr id="4" name="Picture 3" descr="A screenshot of a cell phone&#10;&#10;Description generated with very high confidence">
+            <a:extLst>
+              <a:ext uri="{FF2B5EF4-FFF2-40B4-BE49-F238E27FC236}">
+                <a16:creationId xmlns:a16="http://schemas.microsoft.com/office/drawing/2014/main" id="{FD3A0259-A88C-4692-8441-1D3309C171B0}"/>
+              </a:ext>
+            </a:extLst>
+          </p:cNvPr>
+          <p:cNvPicPr>
+            <a:picLocks noChangeAspect="1"/>
+          </p:cNvPicPr>
+          <p:nvPr/>
+        </p:nvPicPr>
+        <p:blipFill>
+          <a:blip r:embed="rId6">
+            <a:extLst>
+              <a:ext uri="{28A0092B-C50C-407E-A947-70E740481C1C}">
+                <a14:useLocalDpi xmlns:a14="http://schemas.microsoft.com/office/drawing/2010/main" val="0"/>
+              </a:ext>
+            </a:extLst>
+          </a:blip>
+          <a:stretch>
+            <a:fillRect/>
+          </a:stretch>
+        </p:blipFill>
+        <p:spPr>
+          <a:xfrm>
+            <a:off x="7335834" y="643468"/>
+            <a:ext cx="3133724" cy="5571065"/>
+          </a:xfrm>
+          <a:prstGeom prst="rect">
+            <a:avLst/>
+          </a:prstGeom>
+        </p:spPr>
+      </p:pic>
     </p:spTree>
     <p:extLst>
       <p:ext uri="{BB962C8B-B14F-4D97-AF65-F5344CB8AC3E}">

</xml_diff>